<commit_message>
Petites modifications sur le powerpoint
</commit_message>
<xml_diff>
--- a/tools/Referenciel_et_Planing/Projet Avancée CC3.pptx
+++ b/tools/Referenciel_et_Planing/Projet Avancée CC3.pptx
@@ -170,6 +170,14 @@
     </p:ext>
   </p:extLst>
 </p:presentation>
+</file>
+
+<file path=ppt/revisionInfo.xml><?xml version="1.0" encoding="utf-8"?>
+<p1510:revInfo xmlns:a="http://schemas.openxmlformats.org/drawingml/2006/main" xmlns:r="http://schemas.openxmlformats.org/officeDocument/2006/relationships" xmlns:p1510="http://schemas.microsoft.com/office/powerpoint/2015/10/main">
+  <p1510:revLst>
+    <p1510:client id="{00BB72B1-7931-4670-99D3-82B8921FC3F2}" v="146" dt="2025-11-20T15:55:59.312"/>
+  </p1510:revLst>
+</p1510:revInfo>
 </file>
 
 <file path=ppt/ink/ink1.xml><?xml version="1.0" encoding="utf-8"?>
@@ -1022,7 +1030,7 @@
           <a:p>
             <a:fld id="{B7D0A3A0-C9F1-49B2-9E9C-81D1727ED124}" type="slidenum">
               <a:rPr lang="de-DE" smtClean="0"/>
-              <a:t>‹Nr.›</a:t>
+              <a:t>‹#›</a:t>
             </a:fld>
             <a:endParaRPr lang="de-DE"/>
           </a:p>
@@ -1220,7 +1228,7 @@
           <a:p>
             <a:fld id="{B7D0A3A0-C9F1-49B2-9E9C-81D1727ED124}" type="slidenum">
               <a:rPr lang="de-DE" smtClean="0"/>
-              <a:t>‹Nr.›</a:t>
+              <a:t>‹#›</a:t>
             </a:fld>
             <a:endParaRPr lang="de-DE"/>
           </a:p>
@@ -1428,7 +1436,7 @@
           <a:p>
             <a:fld id="{B7D0A3A0-C9F1-49B2-9E9C-81D1727ED124}" type="slidenum">
               <a:rPr lang="de-DE" smtClean="0"/>
-              <a:t>‹Nr.›</a:t>
+              <a:t>‹#›</a:t>
             </a:fld>
             <a:endParaRPr lang="de-DE"/>
           </a:p>
@@ -1626,7 +1634,7 @@
           <a:p>
             <a:fld id="{B7D0A3A0-C9F1-49B2-9E9C-81D1727ED124}" type="slidenum">
               <a:rPr lang="de-DE" smtClean="0"/>
-              <a:t>‹Nr.›</a:t>
+              <a:t>‹#›</a:t>
             </a:fld>
             <a:endParaRPr lang="de-DE"/>
           </a:p>
@@ -1901,7 +1909,7 @@
           <a:p>
             <a:fld id="{B7D0A3A0-C9F1-49B2-9E9C-81D1727ED124}" type="slidenum">
               <a:rPr lang="de-DE" smtClean="0"/>
-              <a:t>‹Nr.›</a:t>
+              <a:t>‹#›</a:t>
             </a:fld>
             <a:endParaRPr lang="de-DE"/>
           </a:p>
@@ -2166,7 +2174,7 @@
           <a:p>
             <a:fld id="{B7D0A3A0-C9F1-49B2-9E9C-81D1727ED124}" type="slidenum">
               <a:rPr lang="de-DE" smtClean="0"/>
-              <a:t>‹Nr.›</a:t>
+              <a:t>‹#›</a:t>
             </a:fld>
             <a:endParaRPr lang="de-DE"/>
           </a:p>
@@ -2578,7 +2586,7 @@
           <a:p>
             <a:fld id="{B7D0A3A0-C9F1-49B2-9E9C-81D1727ED124}" type="slidenum">
               <a:rPr lang="de-DE" smtClean="0"/>
-              <a:t>‹Nr.›</a:t>
+              <a:t>‹#›</a:t>
             </a:fld>
             <a:endParaRPr lang="de-DE"/>
           </a:p>
@@ -2719,7 +2727,7 @@
           <a:p>
             <a:fld id="{B7D0A3A0-C9F1-49B2-9E9C-81D1727ED124}" type="slidenum">
               <a:rPr lang="de-DE" smtClean="0"/>
-              <a:t>‹Nr.›</a:t>
+              <a:t>‹#›</a:t>
             </a:fld>
             <a:endParaRPr lang="de-DE"/>
           </a:p>
@@ -2832,7 +2840,7 @@
           <a:p>
             <a:fld id="{B7D0A3A0-C9F1-49B2-9E9C-81D1727ED124}" type="slidenum">
               <a:rPr lang="de-DE" smtClean="0"/>
-              <a:t>‹Nr.›</a:t>
+              <a:t>‹#›</a:t>
             </a:fld>
             <a:endParaRPr lang="de-DE"/>
           </a:p>
@@ -3143,7 +3151,7 @@
           <a:p>
             <a:fld id="{B7D0A3A0-C9F1-49B2-9E9C-81D1727ED124}" type="slidenum">
               <a:rPr lang="de-DE" smtClean="0"/>
-              <a:t>‹Nr.›</a:t>
+              <a:t>‹#›</a:t>
             </a:fld>
             <a:endParaRPr lang="de-DE"/>
           </a:p>
@@ -3431,7 +3439,7 @@
           <a:p>
             <a:fld id="{B7D0A3A0-C9F1-49B2-9E9C-81D1727ED124}" type="slidenum">
               <a:rPr lang="de-DE" smtClean="0"/>
-              <a:t>‹Nr.›</a:t>
+              <a:t>‹#›</a:t>
             </a:fld>
             <a:endParaRPr lang="de-DE"/>
           </a:p>
@@ -3708,7 +3716,7 @@
           <a:p>
             <a:fld id="{B7D0A3A0-C9F1-49B2-9E9C-81D1727ED124}" type="slidenum">
               <a:rPr lang="de-DE" smtClean="0"/>
-              <a:t>‹Nr.›</a:t>
+              <a:t>‹#›</a:t>
             </a:fld>
             <a:endParaRPr lang="de-DE"/>
           </a:p>
@@ -7162,7 +7170,7 @@
           </a:solidFill>
         </p:spPr>
         <p:txBody>
-          <a:bodyPr wrap="square" rtlCol="0">
+          <a:bodyPr wrap="square" lIns="91440" tIns="45720" rIns="91440" bIns="45720" rtlCol="0" anchor="t">
             <a:spAutoFit/>
           </a:bodyPr>
           <a:lstStyle/>
@@ -7181,15 +7189,15 @@
             </a:r>
             <a:r>
               <a:rPr lang="de-DE" b="1" i="1" dirty="0"/>
-              <a:t> att48.tsp (  </a:t>
+              <a:t> att48.tsp ( </a:t>
             </a:r>
             <a:r>
               <a:rPr lang="de-DE" b="1" i="1" dirty="0" err="1"/>
-              <a:t>language</a:t>
+              <a:t>langage</a:t>
             </a:r>
             <a:r>
               <a:rPr lang="de-DE" b="1" i="1" dirty="0"/>
-              <a:t> C)  </a:t>
+              <a:t> C )  </a:t>
             </a:r>
           </a:p>
         </p:txBody>
@@ -7258,7 +7266,7 @@
           </a:solidFill>
         </p:spPr>
         <p:txBody>
-          <a:bodyPr wrap="square" rtlCol="0">
+          <a:bodyPr wrap="square" lIns="91440" tIns="45720" rIns="91440" bIns="45720" rtlCol="0" anchor="t">
             <a:spAutoFit/>
           </a:bodyPr>
           <a:lstStyle/>
@@ -7277,23 +7285,15 @@
             </a:r>
             <a:r>
               <a:rPr lang="de-DE" b="1" i="1" dirty="0"/>
-              <a:t> att48.tsp (  </a:t>
+              <a:t> att48.tsp ( </a:t>
             </a:r>
             <a:r>
               <a:rPr lang="de-DE" b="1" i="1" dirty="0" err="1"/>
-              <a:t>language</a:t>
+              <a:t>langage</a:t>
             </a:r>
             <a:r>
               <a:rPr lang="de-DE" b="1" i="1" dirty="0"/>
-              <a:t>  </a:t>
-            </a:r>
-            <a:r>
-              <a:rPr lang="de-DE" b="1" i="1" dirty="0" err="1"/>
-              <a:t>Phyton</a:t>
-            </a:r>
-            <a:r>
-              <a:rPr lang="de-DE" b="1" i="1" dirty="0"/>
-              <a:t>)  </a:t>
+              <a:t>  Python )  </a:t>
             </a:r>
           </a:p>
         </p:txBody>
@@ -7328,8 +7328,8 @@
           </a:prstGeom>
         </p:spPr>
       </p:pic>
-      <mc:AlternateContent xmlns:mc="http://schemas.openxmlformats.org/markup-compatibility/2006">
-        <mc:Choice xmlns:p14="http://schemas.microsoft.com/office/powerpoint/2010/main" Requires="p14">
+      <mc:AlternateContent xmlns:mc="http://schemas.openxmlformats.org/markup-compatibility/2006" xmlns:p14="http://schemas.microsoft.com/office/powerpoint/2010/main">
+        <mc:Choice Requires="p14">
           <p:contentPart p14:bwMode="auto" r:id="rId4">
             <p14:nvContentPartPr>
               <p14:cNvPr id="3" name="Freihand 2">
@@ -7348,7 +7348,7 @@
             </p14:xfrm>
           </p:contentPart>
         </mc:Choice>
-        <mc:Fallback>
+        <mc:Fallback xmlns="">
           <p:pic>
             <p:nvPicPr>
               <p:cNvPr id="3" name="Freihand 2">
@@ -7379,8 +7379,8 @@
           </p:pic>
         </mc:Fallback>
       </mc:AlternateContent>
-      <mc:AlternateContent xmlns:mc="http://schemas.openxmlformats.org/markup-compatibility/2006">
-        <mc:Choice xmlns:p14="http://schemas.microsoft.com/office/powerpoint/2010/main" Requires="p14">
+      <mc:AlternateContent xmlns:mc="http://schemas.openxmlformats.org/markup-compatibility/2006" xmlns:p14="http://schemas.microsoft.com/office/powerpoint/2010/main">
+        <mc:Choice Requires="p14">
           <p:contentPart p14:bwMode="auto" r:id="rId6">
             <p14:nvContentPartPr>
               <p14:cNvPr id="7" name="Freihand 6">
@@ -7399,7 +7399,7 @@
             </p14:xfrm>
           </p:contentPart>
         </mc:Choice>
-        <mc:Fallback>
+        <mc:Fallback xmlns="">
           <p:pic>
             <p:nvPicPr>
               <p:cNvPr id="7" name="Freihand 6">
@@ -7430,8 +7430,8 @@
           </p:pic>
         </mc:Fallback>
       </mc:AlternateContent>
-      <mc:AlternateContent xmlns:mc="http://schemas.openxmlformats.org/markup-compatibility/2006">
-        <mc:Choice xmlns:p14="http://schemas.microsoft.com/office/powerpoint/2010/main" Requires="p14">
+      <mc:AlternateContent xmlns:mc="http://schemas.openxmlformats.org/markup-compatibility/2006" xmlns:p14="http://schemas.microsoft.com/office/powerpoint/2010/main">
+        <mc:Choice Requires="p14">
           <p:contentPart p14:bwMode="auto" r:id="rId8">
             <p14:nvContentPartPr>
               <p14:cNvPr id="10" name="Freihand 9">
@@ -7450,7 +7450,7 @@
             </p14:xfrm>
           </p:contentPart>
         </mc:Choice>
-        <mc:Fallback>
+        <mc:Fallback xmlns="">
           <p:pic>
             <p:nvPicPr>
               <p:cNvPr id="10" name="Freihand 9">
@@ -7481,8 +7481,8 @@
           </p:pic>
         </mc:Fallback>
       </mc:AlternateContent>
-      <mc:AlternateContent xmlns:mc="http://schemas.openxmlformats.org/markup-compatibility/2006">
-        <mc:Choice xmlns:p14="http://schemas.microsoft.com/office/powerpoint/2010/main" Requires="p14">
+      <mc:AlternateContent xmlns:mc="http://schemas.openxmlformats.org/markup-compatibility/2006" xmlns:p14="http://schemas.microsoft.com/office/powerpoint/2010/main">
+        <mc:Choice Requires="p14">
           <p:contentPart p14:bwMode="auto" r:id="rId10">
             <p14:nvContentPartPr>
               <p14:cNvPr id="14" name="Freihand 13">
@@ -7501,7 +7501,7 @@
             </p14:xfrm>
           </p:contentPart>
         </mc:Choice>
-        <mc:Fallback>
+        <mc:Fallback xmlns="">
           <p:pic>
             <p:nvPicPr>
               <p:cNvPr id="14" name="Freihand 13">
@@ -10702,44 +10702,16 @@
           </a:solidFill>
         </p:spPr>
         <p:txBody>
-          <a:bodyPr wrap="square" rtlCol="0">
+          <a:bodyPr wrap="square" lIns="91440" tIns="45720" rIns="91440" bIns="45720" rtlCol="0" anchor="t">
             <a:spAutoFit/>
           </a:bodyPr>
           <a:lstStyle/>
           <a:p>
             <a:r>
-              <a:rPr lang="de-DE" b="1" i="1" dirty="0"/>
-              <a:t>Tests </a:t>
-            </a:r>
-            <a:r>
-              <a:rPr lang="de-DE" b="1" i="1" dirty="0" err="1"/>
-              <a:t>manuels</a:t>
-            </a:r>
-            <a:r>
-              <a:rPr lang="de-DE" b="1" i="1" dirty="0"/>
-              <a:t> de nos </a:t>
-            </a:r>
-            <a:r>
-              <a:rPr lang="de-DE" b="1" i="1" dirty="0" err="1"/>
-              <a:t>différentes</a:t>
-            </a:r>
-            <a:r>
-              <a:rPr lang="de-DE" b="1" i="1" dirty="0"/>
-              <a:t> </a:t>
-            </a:r>
-            <a:r>
-              <a:rPr lang="de-DE" b="1" i="1" dirty="0" err="1"/>
-              <a:t>méthodes</a:t>
-            </a:r>
-            <a:r>
-              <a:rPr lang="de-DE" b="1" i="1" dirty="0"/>
-              <a:t> de </a:t>
-            </a:r>
-            <a:r>
-              <a:rPr lang="de-DE" b="1" i="1" dirty="0" err="1"/>
-              <a:t>distance</a:t>
-            </a:r>
-            <a:endParaRPr lang="de-DE" b="1" i="1" dirty="0"/>
+              <a:rPr lang="fr-FR" b="1" i="1" dirty="0"/>
+              <a:t>Tests manuels de nos différentes méthodes de distance</a:t>
+            </a:r>
+            <a:endParaRPr lang="fr-FR" b="1" i="1"/>
           </a:p>
         </p:txBody>
       </p:sp>
@@ -11029,8 +11001,8 @@
           </a:prstGeom>
         </p:spPr>
       </p:pic>
-      <mc:AlternateContent xmlns:mc="http://schemas.openxmlformats.org/markup-compatibility/2006">
-        <mc:Choice xmlns:p14="http://schemas.microsoft.com/office/powerpoint/2010/main" Requires="p14">
+      <mc:AlternateContent xmlns:mc="http://schemas.openxmlformats.org/markup-compatibility/2006" xmlns:p14="http://schemas.microsoft.com/office/powerpoint/2010/main">
+        <mc:Choice Requires="p14">
           <p:contentPart p14:bwMode="auto" r:id="rId4">
             <p14:nvContentPartPr>
               <p14:cNvPr id="7" name="Freihand 6">
@@ -11049,7 +11021,7 @@
             </p14:xfrm>
           </p:contentPart>
         </mc:Choice>
-        <mc:Fallback>
+        <mc:Fallback xmlns="">
           <p:pic>
             <p:nvPicPr>
               <p:cNvPr id="7" name="Freihand 6">
@@ -11080,8 +11052,8 @@
           </p:pic>
         </mc:Fallback>
       </mc:AlternateContent>
-      <mc:AlternateContent xmlns:mc="http://schemas.openxmlformats.org/markup-compatibility/2006">
-        <mc:Choice xmlns:p14="http://schemas.microsoft.com/office/powerpoint/2010/main" Requires="p14">
+      <mc:AlternateContent xmlns:mc="http://schemas.openxmlformats.org/markup-compatibility/2006" xmlns:p14="http://schemas.microsoft.com/office/powerpoint/2010/main">
+        <mc:Choice Requires="p14">
           <p:contentPart p14:bwMode="auto" r:id="rId6">
             <p14:nvContentPartPr>
               <p14:cNvPr id="12" name="Freihand 11">
@@ -11100,7 +11072,7 @@
             </p14:xfrm>
           </p:contentPart>
         </mc:Choice>
-        <mc:Fallback>
+        <mc:Fallback xmlns="">
           <p:pic>
             <p:nvPicPr>
               <p:cNvPr id="12" name="Freihand 11">
@@ -11131,8 +11103,8 @@
           </p:pic>
         </mc:Fallback>
       </mc:AlternateContent>
-      <mc:AlternateContent xmlns:mc="http://schemas.openxmlformats.org/markup-compatibility/2006">
-        <mc:Choice xmlns:p14="http://schemas.microsoft.com/office/powerpoint/2010/main" Requires="p14">
+      <mc:AlternateContent xmlns:mc="http://schemas.openxmlformats.org/markup-compatibility/2006" xmlns:p14="http://schemas.microsoft.com/office/powerpoint/2010/main">
+        <mc:Choice Requires="p14">
           <p:contentPart p14:bwMode="auto" r:id="rId8">
             <p14:nvContentPartPr>
               <p14:cNvPr id="13" name="Freihand 12">
@@ -11151,7 +11123,7 @@
             </p14:xfrm>
           </p:contentPart>
         </mc:Choice>
-        <mc:Fallback>
+        <mc:Fallback xmlns="">
           <p:pic>
             <p:nvPicPr>
               <p:cNvPr id="13" name="Freihand 12">
@@ -11240,7 +11212,7 @@
           </a:solidFill>
         </p:spPr>
         <p:txBody>
-          <a:bodyPr wrap="square" rtlCol="0">
+          <a:bodyPr wrap="square" lIns="91440" tIns="45720" rIns="91440" bIns="45720" rtlCol="0" anchor="t">
             <a:spAutoFit/>
           </a:bodyPr>
           <a:lstStyle/>
@@ -11255,15 +11227,15 @@
             </a:r>
             <a:r>
               <a:rPr lang="de-DE" b="1" i="1" dirty="0"/>
-              <a:t>  (</a:t>
+              <a:t>  ( </a:t>
             </a:r>
             <a:r>
               <a:rPr lang="de-DE" b="1" i="1" dirty="0" err="1"/>
-              <a:t>language</a:t>
+              <a:t>langage</a:t>
             </a:r>
             <a:r>
               <a:rPr lang="de-DE" b="1" i="1" dirty="0"/>
-              <a:t> C) </a:t>
+              <a:t> C ) </a:t>
             </a:r>
           </a:p>
         </p:txBody>
@@ -11296,7 +11268,7 @@
           </a:solidFill>
         </p:spPr>
         <p:txBody>
-          <a:bodyPr wrap="square" rtlCol="0">
+          <a:bodyPr wrap="square" lIns="91440" tIns="45720" rIns="91440" bIns="45720" rtlCol="0" anchor="t">
             <a:spAutoFit/>
           </a:bodyPr>
           <a:lstStyle/>
@@ -11306,20 +11278,20 @@
               <a:t>Brute </a:t>
             </a:r>
             <a:r>
-              <a:rPr lang="de-DE" b="1" i="1" dirty="0" err="1"/>
+              <a:rPr lang="de-DE" b="1" i="1" err="1"/>
               <a:t>force</a:t>
             </a:r>
             <a:r>
               <a:rPr lang="de-DE" b="1" i="1" dirty="0"/>
-              <a:t>  (</a:t>
-            </a:r>
-            <a:r>
-              <a:rPr lang="de-DE" b="1" i="1" dirty="0" err="1"/>
-              <a:t>language</a:t>
-            </a:r>
-            <a:r>
-              <a:rPr lang="de-DE" b="1" i="1" dirty="0"/>
-              <a:t> Python) </a:t>
+              <a:t>  ( </a:t>
+            </a:r>
+            <a:r>
+              <a:rPr lang="de-DE" b="1" i="1" err="1"/>
+              <a:t>langage</a:t>
+            </a:r>
+            <a:r>
+              <a:rPr lang="de-DE" b="1" i="1"/>
+              <a:t> Python ) </a:t>
             </a:r>
           </a:p>
         </p:txBody>
@@ -11384,8 +11356,8 @@
           </a:prstGeom>
         </p:spPr>
       </p:pic>
-      <mc:AlternateContent xmlns:mc="http://schemas.openxmlformats.org/markup-compatibility/2006">
-        <mc:Choice xmlns:p14="http://schemas.microsoft.com/office/powerpoint/2010/main" Requires="p14">
+      <mc:AlternateContent xmlns:mc="http://schemas.openxmlformats.org/markup-compatibility/2006" xmlns:p14="http://schemas.microsoft.com/office/powerpoint/2010/main">
+        <mc:Choice Requires="p14">
           <p:contentPart p14:bwMode="auto" r:id="rId4">
             <p14:nvContentPartPr>
               <p14:cNvPr id="21" name="Freihand 20">
@@ -11404,7 +11376,7 @@
             </p14:xfrm>
           </p:contentPart>
         </mc:Choice>
-        <mc:Fallback>
+        <mc:Fallback xmlns="">
           <p:pic>
             <p:nvPicPr>
               <p:cNvPr id="21" name="Freihand 20">
@@ -11435,8 +11407,8 @@
           </p:pic>
         </mc:Fallback>
       </mc:AlternateContent>
-      <mc:AlternateContent xmlns:mc="http://schemas.openxmlformats.org/markup-compatibility/2006">
-        <mc:Choice xmlns:p14="http://schemas.microsoft.com/office/powerpoint/2010/main" Requires="p14">
+      <mc:AlternateContent xmlns:mc="http://schemas.openxmlformats.org/markup-compatibility/2006" xmlns:p14="http://schemas.microsoft.com/office/powerpoint/2010/main">
+        <mc:Choice Requires="p14">
           <p:contentPart p14:bwMode="auto" r:id="rId6">
             <p14:nvContentPartPr>
               <p14:cNvPr id="24" name="Freihand 23">
@@ -11455,7 +11427,7 @@
             </p14:xfrm>
           </p:contentPart>
         </mc:Choice>
-        <mc:Fallback>
+        <mc:Fallback xmlns="">
           <p:pic>
             <p:nvPicPr>
               <p:cNvPr id="24" name="Freihand 23">
@@ -11486,8 +11458,8 @@
           </p:pic>
         </mc:Fallback>
       </mc:AlternateContent>
-      <mc:AlternateContent xmlns:mc="http://schemas.openxmlformats.org/markup-compatibility/2006">
-        <mc:Choice xmlns:p14="http://schemas.microsoft.com/office/powerpoint/2010/main" Requires="p14">
+      <mc:AlternateContent xmlns:mc="http://schemas.openxmlformats.org/markup-compatibility/2006" xmlns:p14="http://schemas.microsoft.com/office/powerpoint/2010/main">
+        <mc:Choice Requires="p14">
           <p:contentPart p14:bwMode="auto" r:id="rId8">
             <p14:nvContentPartPr>
               <p14:cNvPr id="26" name="Freihand 25">
@@ -11506,7 +11478,7 @@
             </p14:xfrm>
           </p:contentPart>
         </mc:Choice>
-        <mc:Fallback>
+        <mc:Fallback xmlns="">
           <p:pic>
             <p:nvPicPr>
               <p:cNvPr id="26" name="Freihand 25">
@@ -11537,8 +11509,8 @@
           </p:pic>
         </mc:Fallback>
       </mc:AlternateContent>
-      <mc:AlternateContent xmlns:mc="http://schemas.openxmlformats.org/markup-compatibility/2006">
-        <mc:Choice xmlns:p14="http://schemas.microsoft.com/office/powerpoint/2010/main" Requires="p14">
+      <mc:AlternateContent xmlns:mc="http://schemas.openxmlformats.org/markup-compatibility/2006" xmlns:p14="http://schemas.microsoft.com/office/powerpoint/2010/main">
+        <mc:Choice Requires="p14">
           <p:contentPart p14:bwMode="auto" r:id="rId10">
             <p14:nvContentPartPr>
               <p14:cNvPr id="28" name="Freihand 27">
@@ -11557,7 +11529,7 @@
             </p14:xfrm>
           </p:contentPart>
         </mc:Choice>
-        <mc:Fallback>
+        <mc:Fallback xmlns="">
           <p:pic>
             <p:nvPicPr>
               <p:cNvPr id="28" name="Freihand 27">
@@ -11772,22 +11744,22 @@
           </a:solidFill>
         </p:spPr>
         <p:txBody>
-          <a:bodyPr wrap="square" rtlCol="0">
+          <a:bodyPr wrap="square" lIns="91440" tIns="45720" rIns="91440" bIns="45720" rtlCol="0" anchor="t">
             <a:spAutoFit/>
           </a:bodyPr>
           <a:lstStyle/>
           <a:p>
             <a:r>
               <a:rPr lang="de-DE" b="1" i="1" dirty="0"/>
-              <a:t>Random Walk att48.tsp (  </a:t>
-            </a:r>
-            <a:r>
-              <a:rPr lang="de-DE" b="1" i="1" dirty="0" err="1"/>
-              <a:t>language</a:t>
-            </a:r>
-            <a:r>
-              <a:rPr lang="de-DE" b="1" i="1" dirty="0"/>
-              <a:t> C)  </a:t>
+              <a:t>Random Walk att48.tsp ( </a:t>
+            </a:r>
+            <a:r>
+              <a:rPr lang="de-DE" b="1" i="1" err="1"/>
+              <a:t>langage</a:t>
+            </a:r>
+            <a:r>
+              <a:rPr lang="de-DE" b="1" i="1"/>
+              <a:t> C )  </a:t>
             </a:r>
           </a:p>
         </p:txBody>
@@ -11856,7 +11828,7 @@
           </a:solidFill>
         </p:spPr>
         <p:txBody>
-          <a:bodyPr wrap="square" rtlCol="0">
+          <a:bodyPr wrap="square" lIns="91440" tIns="45720" rIns="91440" bIns="45720" rtlCol="0" anchor="t">
             <a:spAutoFit/>
           </a:bodyPr>
           <a:lstStyle/>
@@ -11871,15 +11843,15 @@
             </a:r>
             <a:r>
               <a:rPr lang="de-DE" b="1" i="1" dirty="0"/>
-              <a:t> 2opt att48.tsp (  </a:t>
+              <a:t> 2opt att48.tsp ( </a:t>
             </a:r>
             <a:r>
               <a:rPr lang="de-DE" b="1" i="1" dirty="0" err="1"/>
-              <a:t>language</a:t>
+              <a:t>langage</a:t>
             </a:r>
             <a:r>
               <a:rPr lang="de-DE" b="1" i="1" dirty="0"/>
-              <a:t> C)  </a:t>
+              <a:t> C )  </a:t>
             </a:r>
           </a:p>
         </p:txBody>
@@ -11920,8 +11892,8 @@
           </a:prstGeom>
         </p:spPr>
       </p:pic>
-      <mc:AlternateContent xmlns:mc="http://schemas.openxmlformats.org/markup-compatibility/2006">
-        <mc:Choice xmlns:p14="http://schemas.microsoft.com/office/powerpoint/2010/main" Requires="p14">
+      <mc:AlternateContent xmlns:mc="http://schemas.openxmlformats.org/markup-compatibility/2006" xmlns:p14="http://schemas.microsoft.com/office/powerpoint/2010/main">
+        <mc:Choice Requires="p14">
           <p:contentPart p14:bwMode="auto" r:id="rId4">
             <p14:nvContentPartPr>
               <p14:cNvPr id="3" name="Freihand 2">
@@ -11940,7 +11912,7 @@
             </p14:xfrm>
           </p:contentPart>
         </mc:Choice>
-        <mc:Fallback>
+        <mc:Fallback xmlns="">
           <p:pic>
             <p:nvPicPr>
               <p:cNvPr id="3" name="Freihand 2">
@@ -11971,8 +11943,8 @@
           </p:pic>
         </mc:Fallback>
       </mc:AlternateContent>
-      <mc:AlternateContent xmlns:mc="http://schemas.openxmlformats.org/markup-compatibility/2006">
-        <mc:Choice xmlns:p14="http://schemas.microsoft.com/office/powerpoint/2010/main" Requires="p14">
+      <mc:AlternateContent xmlns:mc="http://schemas.openxmlformats.org/markup-compatibility/2006" xmlns:p14="http://schemas.microsoft.com/office/powerpoint/2010/main">
+        <mc:Choice Requires="p14">
           <p:contentPart p14:bwMode="auto" r:id="rId6">
             <p14:nvContentPartPr>
               <p14:cNvPr id="5" name="Freihand 4">
@@ -11991,7 +11963,7 @@
             </p14:xfrm>
           </p:contentPart>
         </mc:Choice>
-        <mc:Fallback>
+        <mc:Fallback xmlns="">
           <p:pic>
             <p:nvPicPr>
               <p:cNvPr id="5" name="Freihand 4">
@@ -12080,22 +12052,22 @@
           </a:solidFill>
         </p:spPr>
         <p:txBody>
-          <a:bodyPr wrap="square" rtlCol="0">
+          <a:bodyPr wrap="square" lIns="91440" tIns="45720" rIns="91440" bIns="45720" rtlCol="0" anchor="t">
             <a:spAutoFit/>
           </a:bodyPr>
           <a:lstStyle/>
           <a:p>
             <a:r>
-              <a:rPr lang="de-DE" dirty="0"/>
-              <a:t>Random Walk att48.tsp (  </a:t>
-            </a:r>
-            <a:r>
-              <a:rPr lang="de-DE" dirty="0" err="1"/>
-              <a:t>language</a:t>
-            </a:r>
-            <a:r>
-              <a:rPr lang="de-DE" dirty="0"/>
-              <a:t>  Python)  </a:t>
+              <a:rPr lang="de-DE" b="1" i="1" dirty="0"/>
+              <a:t>Random Walk att48.tsp ( </a:t>
+            </a:r>
+            <a:r>
+              <a:rPr lang="de-DE" b="1" i="1" dirty="0" err="1"/>
+              <a:t>langage</a:t>
+            </a:r>
+            <a:r>
+              <a:rPr lang="de-DE" b="1" i="1" dirty="0"/>
+              <a:t>  Python )  </a:t>
             </a:r>
           </a:p>
         </p:txBody>
@@ -12128,30 +12100,30 @@
           </a:solidFill>
         </p:spPr>
         <p:txBody>
-          <a:bodyPr wrap="square" rtlCol="0">
+          <a:bodyPr wrap="square" lIns="91440" tIns="45720" rIns="91440" bIns="45720" rtlCol="0" anchor="t">
             <a:spAutoFit/>
           </a:bodyPr>
           <a:lstStyle/>
           <a:p>
             <a:r>
-              <a:rPr lang="de-DE" dirty="0"/>
+              <a:rPr lang="de-DE" b="1" i="1" dirty="0"/>
               <a:t>Random Walk </a:t>
             </a:r>
             <a:r>
-              <a:rPr lang="de-DE" dirty="0" err="1"/>
+              <a:rPr lang="de-DE" b="1" i="1" err="1"/>
               <a:t>avec</a:t>
             </a:r>
             <a:r>
-              <a:rPr lang="de-DE" dirty="0"/>
-              <a:t> 2opt att48.tsp (  </a:t>
-            </a:r>
-            <a:r>
-              <a:rPr lang="de-DE" dirty="0" err="1"/>
-              <a:t>language</a:t>
-            </a:r>
-            <a:r>
-              <a:rPr lang="de-DE" dirty="0"/>
-              <a:t> Python)  </a:t>
+              <a:rPr lang="de-DE" b="1" i="1"/>
+              <a:t> 2opt att48.tsp ( </a:t>
+            </a:r>
+            <a:r>
+              <a:rPr lang="de-DE" b="1" i="1" err="1"/>
+              <a:t>langage</a:t>
+            </a:r>
+            <a:r>
+              <a:rPr lang="de-DE" b="1" i="1"/>
+              <a:t> Python )  </a:t>
             </a:r>
           </a:p>
         </p:txBody>
@@ -12228,8 +12200,8 @@
           </a:prstGeom>
         </p:spPr>
       </p:pic>
-      <mc:AlternateContent xmlns:mc="http://schemas.openxmlformats.org/markup-compatibility/2006">
-        <mc:Choice xmlns:p14="http://schemas.microsoft.com/office/powerpoint/2010/main" Requires="p14">
+      <mc:AlternateContent xmlns:mc="http://schemas.openxmlformats.org/markup-compatibility/2006" xmlns:p14="http://schemas.microsoft.com/office/powerpoint/2010/main">
+        <mc:Choice Requires="p14">
           <p:contentPart p14:bwMode="auto" r:id="rId4">
             <p14:nvContentPartPr>
               <p14:cNvPr id="3" name="Freihand 2">
@@ -12248,7 +12220,7 @@
             </p14:xfrm>
           </p:contentPart>
         </mc:Choice>
-        <mc:Fallback>
+        <mc:Fallback xmlns="">
           <p:pic>
             <p:nvPicPr>
               <p:cNvPr id="3" name="Freihand 2">
@@ -12279,8 +12251,8 @@
           </p:pic>
         </mc:Fallback>
       </mc:AlternateContent>
-      <mc:AlternateContent xmlns:mc="http://schemas.openxmlformats.org/markup-compatibility/2006">
-        <mc:Choice xmlns:p14="http://schemas.microsoft.com/office/powerpoint/2010/main" Requires="p14">
+      <mc:AlternateContent xmlns:mc="http://schemas.openxmlformats.org/markup-compatibility/2006" xmlns:p14="http://schemas.microsoft.com/office/powerpoint/2010/main">
+        <mc:Choice Requires="p14">
           <p:contentPart p14:bwMode="auto" r:id="rId6">
             <p14:nvContentPartPr>
               <p14:cNvPr id="11" name="Freihand 10">
@@ -12299,7 +12271,7 @@
             </p14:xfrm>
           </p:contentPart>
         </mc:Choice>
-        <mc:Fallback>
+        <mc:Fallback xmlns="">
           <p:pic>
             <p:nvPicPr>
               <p:cNvPr id="11" name="Freihand 10">
@@ -12330,8 +12302,8 @@
           </p:pic>
         </mc:Fallback>
       </mc:AlternateContent>
-      <mc:AlternateContent xmlns:mc="http://schemas.openxmlformats.org/markup-compatibility/2006">
-        <mc:Choice xmlns:p14="http://schemas.microsoft.com/office/powerpoint/2010/main" Requires="p14">
+      <mc:AlternateContent xmlns:mc="http://schemas.openxmlformats.org/markup-compatibility/2006" xmlns:p14="http://schemas.microsoft.com/office/powerpoint/2010/main">
+        <mc:Choice Requires="p14">
           <p:contentPart p14:bwMode="auto" r:id="rId8">
             <p14:nvContentPartPr>
               <p14:cNvPr id="30" name="Freihand 29">
@@ -12350,7 +12322,7 @@
             </p14:xfrm>
           </p:contentPart>
         </mc:Choice>
-        <mc:Fallback>
+        <mc:Fallback xmlns="">
           <p:pic>
             <p:nvPicPr>
               <p:cNvPr id="30" name="Freihand 29">
@@ -12381,8 +12353,8 @@
           </p:pic>
         </mc:Fallback>
       </mc:AlternateContent>
-      <mc:AlternateContent xmlns:mc="http://schemas.openxmlformats.org/markup-compatibility/2006">
-        <mc:Choice xmlns:p14="http://schemas.microsoft.com/office/powerpoint/2010/main" Requires="p14">
+      <mc:AlternateContent xmlns:mc="http://schemas.openxmlformats.org/markup-compatibility/2006" xmlns:p14="http://schemas.microsoft.com/office/powerpoint/2010/main">
+        <mc:Choice Requires="p14">
           <p:contentPart p14:bwMode="auto" r:id="rId10">
             <p14:nvContentPartPr>
               <p14:cNvPr id="32" name="Freihand 31">
@@ -12401,7 +12373,7 @@
             </p14:xfrm>
           </p:contentPart>
         </mc:Choice>
-        <mc:Fallback>
+        <mc:Fallback xmlns="">
           <p:pic>
             <p:nvPicPr>
               <p:cNvPr id="32" name="Freihand 31">
@@ -12490,7 +12462,7 @@
           </a:solidFill>
         </p:spPr>
         <p:txBody>
-          <a:bodyPr wrap="square" rtlCol="0">
+          <a:bodyPr wrap="square" lIns="91440" tIns="45720" rIns="91440" bIns="45720" rtlCol="0" anchor="t">
             <a:spAutoFit/>
           </a:bodyPr>
           <a:lstStyle/>
@@ -12513,15 +12485,15 @@
             </a:r>
             <a:r>
               <a:rPr lang="de-DE" b="1" i="1" dirty="0"/>
-              <a:t> att48.tsp (  </a:t>
+              <a:t> att48.tsp ( </a:t>
             </a:r>
             <a:r>
               <a:rPr lang="de-DE" b="1" i="1" dirty="0" err="1"/>
-              <a:t>language</a:t>
+              <a:t>langage</a:t>
             </a:r>
             <a:r>
               <a:rPr lang="de-DE" b="1" i="1" dirty="0"/>
-              <a:t> C)  </a:t>
+              <a:t> C )  </a:t>
             </a:r>
           </a:p>
         </p:txBody>
@@ -12554,7 +12526,7 @@
           </a:solidFill>
         </p:spPr>
         <p:txBody>
-          <a:bodyPr wrap="square" rtlCol="0">
+          <a:bodyPr wrap="square" lIns="91440" tIns="45720" rIns="91440" bIns="45720" rtlCol="0" anchor="t">
             <a:spAutoFit/>
           </a:bodyPr>
           <a:lstStyle/>
@@ -12585,15 +12557,15 @@
             </a:r>
             <a:r>
               <a:rPr lang="de-DE" b="1" i="1" dirty="0"/>
-              <a:t> 2opt att48.tsp (  </a:t>
+              <a:t> 2opt att48.tsp ( </a:t>
             </a:r>
             <a:r>
               <a:rPr lang="de-DE" b="1" i="1" dirty="0" err="1"/>
-              <a:t>language</a:t>
+              <a:t>langage</a:t>
             </a:r>
             <a:r>
               <a:rPr lang="de-DE" b="1" i="1" dirty="0"/>
-              <a:t> C)  </a:t>
+              <a:t> C )  </a:t>
             </a:r>
           </a:p>
         </p:txBody>
@@ -12670,8 +12642,8 @@
           </a:prstGeom>
         </p:spPr>
       </p:pic>
-      <mc:AlternateContent xmlns:mc="http://schemas.openxmlformats.org/markup-compatibility/2006">
-        <mc:Choice xmlns:p14="http://schemas.microsoft.com/office/powerpoint/2010/main" Requires="p14">
+      <mc:AlternateContent xmlns:mc="http://schemas.openxmlformats.org/markup-compatibility/2006" xmlns:p14="http://schemas.microsoft.com/office/powerpoint/2010/main">
+        <mc:Choice Requires="p14">
           <p:contentPart p14:bwMode="auto" r:id="rId4">
             <p14:nvContentPartPr>
               <p14:cNvPr id="3" name="Freihand 2">
@@ -12690,7 +12662,7 @@
             </p14:xfrm>
           </p:contentPart>
         </mc:Choice>
-        <mc:Fallback>
+        <mc:Fallback xmlns="">
           <p:pic>
             <p:nvPicPr>
               <p:cNvPr id="3" name="Freihand 2">
@@ -12721,8 +12693,8 @@
           </p:pic>
         </mc:Fallback>
       </mc:AlternateContent>
-      <mc:AlternateContent xmlns:mc="http://schemas.openxmlformats.org/markup-compatibility/2006">
-        <mc:Choice xmlns:p14="http://schemas.microsoft.com/office/powerpoint/2010/main" Requires="p14">
+      <mc:AlternateContent xmlns:mc="http://schemas.openxmlformats.org/markup-compatibility/2006" xmlns:p14="http://schemas.microsoft.com/office/powerpoint/2010/main">
+        <mc:Choice Requires="p14">
           <p:contentPart p14:bwMode="auto" r:id="rId6">
             <p14:nvContentPartPr>
               <p14:cNvPr id="8" name="Freihand 7">
@@ -12741,7 +12713,7 @@
             </p14:xfrm>
           </p:contentPart>
         </mc:Choice>
-        <mc:Fallback>
+        <mc:Fallback xmlns="">
           <p:pic>
             <p:nvPicPr>
               <p:cNvPr id="8" name="Freihand 7">
@@ -12830,7 +12802,7 @@
           </a:solidFill>
         </p:spPr>
         <p:txBody>
-          <a:bodyPr wrap="square" rtlCol="0">
+          <a:bodyPr wrap="square" lIns="91440" tIns="45720" rIns="91440" bIns="45720" rtlCol="0" anchor="t">
             <a:spAutoFit/>
           </a:bodyPr>
           <a:lstStyle/>
@@ -12853,7 +12825,7 @@
             </a:r>
             <a:r>
               <a:rPr lang="de-DE" b="1" i="1" dirty="0"/>
-              <a:t> att48.tsp (  </a:t>
+              <a:t> att48.tsp ( </a:t>
             </a:r>
             <a:r>
               <a:rPr lang="de-DE" b="1" i="1" dirty="0" err="1"/>
@@ -12861,7 +12833,7 @@
             </a:r>
             <a:r>
               <a:rPr lang="de-DE" b="1" i="1" dirty="0"/>
-              <a:t> Python)  </a:t>
+              <a:t> Python )  </a:t>
             </a:r>
           </a:p>
         </p:txBody>
@@ -12894,7 +12866,7 @@
           </a:solidFill>
         </p:spPr>
         <p:txBody>
-          <a:bodyPr wrap="square" rtlCol="0">
+          <a:bodyPr wrap="square" lIns="91440" tIns="45720" rIns="91440" bIns="45720" rtlCol="0" anchor="t">
             <a:spAutoFit/>
           </a:bodyPr>
           <a:lstStyle/>
@@ -12925,7 +12897,7 @@
             </a:r>
             <a:r>
               <a:rPr lang="de-DE" b="1" i="1" dirty="0"/>
-              <a:t> 2opt att48.tsp (  </a:t>
+              <a:t> 2opt att48.tsp ( </a:t>
             </a:r>
             <a:r>
               <a:rPr lang="de-DE" b="1" i="1" dirty="0" err="1"/>
@@ -12933,7 +12905,7 @@
             </a:r>
             <a:r>
               <a:rPr lang="de-DE" b="1" i="1" dirty="0"/>
-              <a:t> Python)  </a:t>
+              <a:t> Python )  </a:t>
             </a:r>
           </a:p>
         </p:txBody>
@@ -13004,8 +12976,8 @@
           </a:prstGeom>
         </p:spPr>
       </p:pic>
-      <mc:AlternateContent xmlns:mc="http://schemas.openxmlformats.org/markup-compatibility/2006">
-        <mc:Choice xmlns:p14="http://schemas.microsoft.com/office/powerpoint/2010/main" Requires="p14">
+      <mc:AlternateContent xmlns:mc="http://schemas.openxmlformats.org/markup-compatibility/2006" xmlns:p14="http://schemas.microsoft.com/office/powerpoint/2010/main">
+        <mc:Choice Requires="p14">
           <p:contentPart p14:bwMode="auto" r:id="rId4">
             <p14:nvContentPartPr>
               <p14:cNvPr id="3" name="Freihand 2">
@@ -13024,7 +12996,7 @@
             </p14:xfrm>
           </p:contentPart>
         </mc:Choice>
-        <mc:Fallback>
+        <mc:Fallback xmlns="">
           <p:pic>
             <p:nvPicPr>
               <p:cNvPr id="3" name="Freihand 2">
@@ -13055,8 +13027,8 @@
           </p:pic>
         </mc:Fallback>
       </mc:AlternateContent>
-      <mc:AlternateContent xmlns:mc="http://schemas.openxmlformats.org/markup-compatibility/2006">
-        <mc:Choice xmlns:p14="http://schemas.microsoft.com/office/powerpoint/2010/main" Requires="p14">
+      <mc:AlternateContent xmlns:mc="http://schemas.openxmlformats.org/markup-compatibility/2006" xmlns:p14="http://schemas.microsoft.com/office/powerpoint/2010/main">
+        <mc:Choice Requires="p14">
           <p:contentPart p14:bwMode="auto" r:id="rId6">
             <p14:nvContentPartPr>
               <p14:cNvPr id="12" name="Freihand 11">
@@ -13075,7 +13047,7 @@
             </p14:xfrm>
           </p:contentPart>
         </mc:Choice>
-        <mc:Fallback>
+        <mc:Fallback xmlns="">
           <p:pic>
             <p:nvPicPr>
               <p:cNvPr id="12" name="Freihand 11">

</xml_diff>